<commit_message>
update slide to use payara micro
</commit_message>
<xml_diff>
--- a/dockerized-pipeline/dockerized-pipeline.pptx
+++ b/dockerized-pipeline/dockerized-pipeline.pptx
@@ -263,7 +263,7 @@
           <a:p>
             <a:fld id="{265264BF-C1BC-4487-96E8-D4B892543B5A}" type="datetimeFigureOut">
               <a:rPr lang="de-DE" smtClean="0"/>
-              <a:t>06.11.2019</a:t>
+              <a:t>07.11.2019</a:t>
             </a:fld>
             <a:endParaRPr lang="de-DE"/>
           </a:p>
@@ -428,7 +428,7 @@
           <a:p>
             <a:fld id="{AE2DE115-FA53-464A-A2EA-90113F807A49}" type="datetimeFigureOut">
               <a:rPr lang="de-DE" smtClean="0"/>
-              <a:t>06.11.2019</a:t>
+              <a:t>07.11.2019</a:t>
             </a:fld>
             <a:endParaRPr lang="de-DE"/>
           </a:p>
@@ -1241,7 +1241,7 @@
           <a:graphicData uri="http://schemas.openxmlformats.org/presentationml/2006/ole">
             <mc:AlternateContent xmlns:mc="http://schemas.openxmlformats.org/markup-compatibility/2006">
               <mc:Choice xmlns:v="urn:schemas-microsoft-com:vml" Requires="v">
-                <p:oleObj spid="_x0000_s2070" name="think-cell Folie" r:id="rId6" imgW="270" imgH="270" progId="TCLayout.ActiveDocument.1">
+                <p:oleObj spid="_x0000_s2071" name="think-cell Folie" r:id="rId6" imgW="270" imgH="270" progId="TCLayout.ActiveDocument.1">
                   <p:embed/>
                 </p:oleObj>
               </mc:Choice>
@@ -23511,7 +23511,7 @@
           <a:graphicData uri="http://schemas.openxmlformats.org/presentationml/2006/ole">
             <mc:AlternateContent xmlns:mc="http://schemas.openxmlformats.org/markup-compatibility/2006">
               <mc:Choice xmlns:v="urn:schemas-microsoft-com:vml" Requires="v">
-                <p:oleObj spid="_x0000_s1050" name="think-cell Folie" r:id="rId4" imgW="270" imgH="270" progId="TCLayout.ActiveDocument.1">
+                <p:oleObj spid="_x0000_s1051" name="think-cell Folie" r:id="rId4" imgW="270" imgH="270" progId="TCLayout.ActiveDocument.1">
                   <p:embed/>
                 </p:oleObj>
               </mc:Choice>
@@ -38358,15 +38358,7 @@
                   <a:schemeClr val="tx1"/>
                 </a:solidFill>
               </a:rPr>
-              <a:t>ource </a:t>
-            </a:r>
-            <a:r>
-              <a:rPr lang="en-US" sz="1600" dirty="0" smtClean="0">
-                <a:solidFill>
-                  <a:schemeClr val="tx1"/>
-                </a:solidFill>
-              </a:rPr>
-              <a:t>code of application</a:t>
+              <a:t>ource code of application</a:t>
             </a:r>
           </a:p>
         </p:txBody>
@@ -39157,12 +39149,12 @@
               </a:buClr>
             </a:pPr>
             <a:r>
-              <a:rPr lang="en-US" sz="1600" dirty="0" err="1" smtClean="0">
+              <a:rPr lang="en-US" sz="1600" dirty="0" smtClean="0">
                 <a:solidFill>
                   <a:schemeClr val="tx1"/>
                 </a:solidFill>
               </a:rPr>
-              <a:t>TomEE</a:t>
+              <a:t>Payara Micro</a:t>
             </a:r>
             <a:endParaRPr lang="en-US" sz="1600" dirty="0" smtClean="0">
               <a:solidFill>
@@ -44092,6 +44084,26 @@
 </file>
 
 <file path=customXml/item1.xml><?xml version="1.0" encoding="utf-8"?>
+<?mso-contentType ?>
+<FormTemplates xmlns="http://schemas.microsoft.com/sharepoint/v3/contenttype/forms">
+  <Display>DocumentLibraryForm</Display>
+  <Edit>DocumentLibraryForm</Edit>
+  <New>DocumentLibraryForm</New>
+</FormTemplates>
+</file>
+
+<file path=customXml/item2.xml><?xml version="1.0" encoding="utf-8"?>
+<p:properties xmlns:p="http://schemas.microsoft.com/office/2006/metadata/properties" xmlns:xsi="http://www.w3.org/2001/XMLSchema-instance" xmlns:pc="http://schemas.microsoft.com/office/infopath/2007/PartnerControls">
+  <documentManagement>
+    <Vorschau xmlns="7bf896f9-b70e-484a-9b07-51e01ab96261">
+      <Url xsi:nil="true"/>
+      <Description xsi:nil="true"/>
+    </Vorschau>
+  </documentManagement>
+</p:properties>
+</file>
+
+<file path=customXml/item3.xml><?xml version="1.0" encoding="utf-8"?>
 <ct:contentTypeSchema xmlns:ct="http://schemas.microsoft.com/office/2006/metadata/contentType" xmlns:ma="http://schemas.microsoft.com/office/2006/metadata/properties/metaAttributes" ct:_="" ma:_="" ma:contentTypeName="Document" ma:contentTypeID="0x0101000D0F58DE773C6D40A692DCE33C72DBBF" ma:contentTypeVersion="1" ma:contentTypeDescription="Create a new document." ma:contentTypeScope="" ma:versionID="366fe772d641758865a68112bec7ac05">
   <xsd:schema xmlns:xsd="http://www.w3.org/2001/XMLSchema" xmlns:xs="http://www.w3.org/2001/XMLSchema" xmlns:p="http://schemas.microsoft.com/office/2006/metadata/properties" xmlns:ns2="7bf896f9-b70e-484a-9b07-51e01ab96261" targetNamespace="http://schemas.microsoft.com/office/2006/metadata/properties" ma:root="true" ma:fieldsID="4b73471d5d2a18e8e5c1441683c27c4d" ns2:_="">
     <xsd:import namespace="7bf896f9-b70e-484a-9b07-51e01ab96261"/>
@@ -44224,40 +44236,10 @@
 </ct:contentTypeSchema>
 </file>
 
-<file path=customXml/item2.xml><?xml version="1.0" encoding="utf-8"?>
-<p:properties xmlns:p="http://schemas.microsoft.com/office/2006/metadata/properties" xmlns:xsi="http://www.w3.org/2001/XMLSchema-instance" xmlns:pc="http://schemas.microsoft.com/office/infopath/2007/PartnerControls">
-  <documentManagement>
-    <Vorschau xmlns="7bf896f9-b70e-484a-9b07-51e01ab96261">
-      <Url xsi:nil="true"/>
-      <Description xsi:nil="true"/>
-    </Vorschau>
-  </documentManagement>
-</p:properties>
-</file>
-
-<file path=customXml/item3.xml><?xml version="1.0" encoding="utf-8"?>
-<?mso-contentType ?>
-<FormTemplates xmlns="http://schemas.microsoft.com/sharepoint/v3/contenttype/forms">
-  <Display>DocumentLibraryForm</Display>
-  <Edit>DocumentLibraryForm</Edit>
-  <New>DocumentLibraryForm</New>
-</FormTemplates>
-</file>
-
 <file path=customXml/itemProps1.xml><?xml version="1.0" encoding="utf-8"?>
-<ds:datastoreItem xmlns:ds="http://schemas.openxmlformats.org/officeDocument/2006/customXml" ds:itemID="{D6F1E390-B81E-4B68-85EA-B2180E59F3C5}">
+<ds:datastoreItem xmlns:ds="http://schemas.openxmlformats.org/officeDocument/2006/customXml" ds:itemID="{43F9EFE3-7271-4746-8DD6-AD339C2BE3BB}">
   <ds:schemaRefs>
-    <ds:schemaRef ds:uri="http://schemas.microsoft.com/office/2006/metadata/contentType"/>
-    <ds:schemaRef ds:uri="http://schemas.microsoft.com/office/2006/metadata/properties/metaAttributes"/>
-    <ds:schemaRef ds:uri="http://www.w3.org/2001/XMLSchema"/>
-    <ds:schemaRef ds:uri="http://schemas.microsoft.com/office/2006/metadata/properties"/>
-    <ds:schemaRef ds:uri="7bf896f9-b70e-484a-9b07-51e01ab96261"/>
-    <ds:schemaRef ds:uri="http://schemas.microsoft.com/office/2006/documentManagement/types"/>
-    <ds:schemaRef ds:uri="http://schemas.microsoft.com/office/infopath/2007/PartnerControls"/>
-    <ds:schemaRef ds:uri="http://schemas.openxmlformats.org/package/2006/metadata/core-properties"/>
-    <ds:schemaRef ds:uri="http://purl.org/dc/elements/1.1/"/>
-    <ds:schemaRef ds:uri="http://purl.org/dc/terms/"/>
-    <ds:schemaRef ds:uri="http://schemas.microsoft.com/internal/obd"/>
+    <ds:schemaRef ds:uri="http://schemas.microsoft.com/sharepoint/v3/contenttype/forms"/>
   </ds:schemaRefs>
 </ds:datastoreItem>
 </file>
@@ -44279,9 +44261,19 @@
 </file>
 
 <file path=customXml/itemProps3.xml><?xml version="1.0" encoding="utf-8"?>
-<ds:datastoreItem xmlns:ds="http://schemas.openxmlformats.org/officeDocument/2006/customXml" ds:itemID="{43F9EFE3-7271-4746-8DD6-AD339C2BE3BB}">
+<ds:datastoreItem xmlns:ds="http://schemas.openxmlformats.org/officeDocument/2006/customXml" ds:itemID="{D6F1E390-B81E-4B68-85EA-B2180E59F3C5}">
   <ds:schemaRefs>
-    <ds:schemaRef ds:uri="http://schemas.microsoft.com/sharepoint/v3/contenttype/forms"/>
+    <ds:schemaRef ds:uri="http://schemas.microsoft.com/office/2006/metadata/contentType"/>
+    <ds:schemaRef ds:uri="http://schemas.microsoft.com/office/2006/metadata/properties/metaAttributes"/>
+    <ds:schemaRef ds:uri="http://www.w3.org/2001/XMLSchema"/>
+    <ds:schemaRef ds:uri="http://schemas.microsoft.com/office/2006/metadata/properties"/>
+    <ds:schemaRef ds:uri="7bf896f9-b70e-484a-9b07-51e01ab96261"/>
+    <ds:schemaRef ds:uri="http://schemas.microsoft.com/office/2006/documentManagement/types"/>
+    <ds:schemaRef ds:uri="http://schemas.microsoft.com/office/infopath/2007/PartnerControls"/>
+    <ds:schemaRef ds:uri="http://schemas.openxmlformats.org/package/2006/metadata/core-properties"/>
+    <ds:schemaRef ds:uri="http://purl.org/dc/elements/1.1/"/>
+    <ds:schemaRef ds:uri="http://purl.org/dc/terms/"/>
+    <ds:schemaRef ds:uri="http://schemas.microsoft.com/internal/obd"/>
   </ds:schemaRefs>
 </ds:datastoreItem>
 </file>
</xml_diff>